<commit_message>
Reference Code and Presentations
Making some changes
</commit_message>
<xml_diff>
--- a/Presentations/Sprint 1 Review.pptx
+++ b/Presentations/Sprint 1 Review.pptx
@@ -3630,6 +3630,13 @@
   <p:clrMapOvr>
     <a:masterClrMapping/>
   </p:clrMapOvr>
+  <p:timing>
+    <p:tnLst>
+      <p:par>
+        <p:cTn id="1" dur="indefinite" restart="never" nodeType="tmRoot"/>
+      </p:par>
+    </p:tnLst>
+  </p:timing>
 </p:sld>
 </file>
 
@@ -3715,6 +3722,13 @@
   <p:clrMapOvr>
     <a:masterClrMapping/>
   </p:clrMapOvr>
+  <p:timing>
+    <p:tnLst>
+      <p:par>
+        <p:cTn id="1" dur="indefinite" restart="never" nodeType="tmRoot"/>
+      </p:par>
+    </p:tnLst>
+  </p:timing>
 </p:sld>
 </file>
 
@@ -3801,6 +3815,13 @@
   <p:clrMapOvr>
     <a:masterClrMapping/>
   </p:clrMapOvr>
+  <p:timing>
+    <p:tnLst>
+      <p:par>
+        <p:cTn id="1" dur="indefinite" restart="never" nodeType="tmRoot"/>
+      </p:par>
+    </p:tnLst>
+  </p:timing>
 </p:sld>
 </file>
 
@@ -3903,6 +3924,13 @@
   <p:clrMapOvr>
     <a:masterClrMapping/>
   </p:clrMapOvr>
+  <p:timing>
+    <p:tnLst>
+      <p:par>
+        <p:cTn id="1" dur="indefinite" restart="never" nodeType="tmRoot"/>
+      </p:par>
+    </p:tnLst>
+  </p:timing>
 </p:sld>
 </file>
 
@@ -3978,7 +4006,7 @@
           </a:p>
           <a:p>
             <a:r>
-              <a:rPr lang="en-US"/>
+              <a:rPr lang="en-US" dirty="0"/>
               <a:t>Individual improvements?</a:t>
             </a:r>
           </a:p>
@@ -3997,6 +4025,13 @@
   <p:clrMapOvr>
     <a:masterClrMapping/>
   </p:clrMapOvr>
+  <p:timing>
+    <p:tnLst>
+      <p:par>
+        <p:cTn id="1" dur="indefinite" restart="never" nodeType="tmRoot"/>
+      </p:par>
+    </p:tnLst>
+  </p:timing>
 </p:sld>
 </file>
 
@@ -4082,6 +4117,13 @@
   <p:clrMapOvr>
     <a:masterClrMapping/>
   </p:clrMapOvr>
+  <p:timing>
+    <p:tnLst>
+      <p:par>
+        <p:cTn id="1" dur="indefinite" restart="never" nodeType="tmRoot"/>
+      </p:par>
+    </p:tnLst>
+  </p:timing>
 </p:sld>
 </file>
 

</xml_diff>